<commit_message>
actualizado ppt estado de los datos
add info sobre estado
</commit_message>
<xml_diff>
--- a/Datos/Estado de los datos.pptx
+++ b/Datos/Estado de los datos.pptx
@@ -13,6 +13,7 @@
     <p:sldId id="258" r:id="rId8"/>
     <p:sldId id="259" r:id="rId9"/>
     <p:sldId id="260" r:id="rId10"/>
+    <p:sldId id="261" r:id="rId11"/>
   </p:sldIdLst>
   <p:sldSz cy="5143500" cx="9144000"/>
   <p:notesSz cx="6858000" cy="9144000"/>
@@ -808,7 +809,7 @@
       </p:grpSpPr>
       <p:sp>
         <p:nvSpPr>
-          <p:cNvPr id="56" name="Google Shape;56;g2ebf47105cd_0_1:notes"/>
+          <p:cNvPr id="56" name="Google Shape;56;g215968f7415_0_0:notes"/>
           <p:cNvSpPr/>
           <p:nvPr>
             <p:ph idx="2" type="sldImg"/>
@@ -843,7 +844,7 @@
       </p:sp>
       <p:sp>
         <p:nvSpPr>
-          <p:cNvPr id="57" name="Google Shape;57;g2ebf47105cd_0_1:notes"/>
+          <p:cNvPr id="57" name="Google Shape;57;g215968f7415_0_0:notes"/>
           <p:cNvSpPr txBox="1"/>
           <p:nvPr>
             <p:ph idx="1" type="body"/>
@@ -907,7 +908,7 @@
       </p:grpSpPr>
       <p:sp>
         <p:nvSpPr>
-          <p:cNvPr id="62" name="Google Shape;62;g2ebf47105cd_0_18:notes"/>
+          <p:cNvPr id="62" name="Google Shape;62;g2ebf47105cd_0_1:notes"/>
           <p:cNvSpPr/>
           <p:nvPr>
             <p:ph idx="2" type="sldImg"/>
@@ -942,7 +943,7 @@
       </p:sp>
       <p:sp>
         <p:nvSpPr>
-          <p:cNvPr id="63" name="Google Shape;63;g2ebf47105cd_0_18:notes"/>
+          <p:cNvPr id="63" name="Google Shape;63;g2ebf47105cd_0_1:notes"/>
           <p:cNvSpPr txBox="1"/>
           <p:nvPr>
             <p:ph idx="1" type="body"/>
@@ -1006,7 +1007,7 @@
       </p:grpSpPr>
       <p:sp>
         <p:nvSpPr>
-          <p:cNvPr id="68" name="Google Shape;68;g2ebf47105cd_0_26:notes"/>
+          <p:cNvPr id="68" name="Google Shape;68;g2ebf47105cd_0_18:notes"/>
           <p:cNvSpPr/>
           <p:nvPr>
             <p:ph idx="2" type="sldImg"/>
@@ -1041,7 +1042,7 @@
       </p:sp>
       <p:sp>
         <p:nvSpPr>
-          <p:cNvPr id="69" name="Google Shape;69;g2ebf47105cd_0_26:notes"/>
+          <p:cNvPr id="69" name="Google Shape;69;g2ebf47105cd_0_18:notes"/>
           <p:cNvSpPr txBox="1"/>
           <p:nvPr>
             <p:ph idx="1" type="body"/>
@@ -1105,7 +1106,7 @@
       </p:grpSpPr>
       <p:sp>
         <p:nvSpPr>
-          <p:cNvPr id="74" name="Google Shape;74;g2ebf47105cd_0_7:notes"/>
+          <p:cNvPr id="74" name="Google Shape;74;g2ebf47105cd_0_26:notes"/>
           <p:cNvSpPr/>
           <p:nvPr>
             <p:ph idx="2" type="sldImg"/>
@@ -1140,7 +1141,106 @@
       </p:sp>
       <p:sp>
         <p:nvSpPr>
-          <p:cNvPr id="75" name="Google Shape;75;g2ebf47105cd_0_7:notes"/>
+          <p:cNvPr id="75" name="Google Shape;75;g2ebf47105cd_0_26:notes"/>
+          <p:cNvSpPr txBox="1"/>
+          <p:nvPr>
+            <p:ph idx="1" type="body"/>
+          </p:nvPr>
+        </p:nvSpPr>
+        <p:spPr>
+          <a:xfrm>
+            <a:off x="685800" y="4343400"/>
+            <a:ext cx="5486400" cy="4114800"/>
+          </a:xfrm>
+          <a:prstGeom prst="rect">
+            <a:avLst/>
+          </a:prstGeom>
+        </p:spPr>
+        <p:txBody>
+          <a:bodyPr anchorCtr="0" anchor="t" bIns="91425" lIns="91425" spcFirstLastPara="1" rIns="91425" wrap="square" tIns="91425">
+            <a:noAutofit/>
+          </a:bodyPr>
+          <a:lstStyle/>
+          <a:p>
+            <a:pPr indent="0" lvl="0" marL="0" rtl="0" algn="l">
+              <a:spcBef>
+                <a:spcPts val="0"/>
+              </a:spcBef>
+              <a:spcAft>
+                <a:spcPts val="0"/>
+              </a:spcAft>
+              <a:buNone/>
+            </a:pPr>
+            <a:r>
+              <a:t/>
+            </a:r>
+            <a:endParaRPr/>
+          </a:p>
+        </p:txBody>
+      </p:sp>
+    </p:spTree>
+  </p:cSld>
+  <p:clrMapOvr>
+    <a:masterClrMapping/>
+  </p:clrMapOvr>
+</p:notes>
+</file>
+
+<file path=ppt/notesSlides/notesSlide6.xml><?xml version="1.0" encoding="utf-8"?>
+<p:notes xmlns:a="http://schemas.openxmlformats.org/drawingml/2006/main" xmlns:r="http://schemas.openxmlformats.org/officeDocument/2006/relationships" xmlns:mc="http://schemas.openxmlformats.org/markup-compatibility/2006" xmlns:mv="urn:schemas-microsoft-com:mac:vml" xmlns:p="http://schemas.openxmlformats.org/presentationml/2006/main" xmlns:c="http://schemas.openxmlformats.org/drawingml/2006/chart" xmlns:dgm="http://schemas.openxmlformats.org/drawingml/2006/diagram" xmlns:o="urn:schemas-microsoft-com:office:office" xmlns:v="urn:schemas-microsoft-com:vml" xmlns:pvml="urn:schemas-microsoft-com:office:powerpoint" xmlns:com="http://schemas.openxmlformats.org/drawingml/2006/compatibility" xmlns:p14="http://schemas.microsoft.com/office/powerpoint/2010/main" xmlns:p15="http://schemas.microsoft.com/office/powerpoint/2012/main" xmlns:ahyp="http://schemas.microsoft.com/office/drawing/2018/hyperlinkcolor" showMasterPhAnim="0" showMasterSp="0">
+  <p:cSld>
+    <p:spTree>
+      <p:nvGrpSpPr>
+        <p:cNvPr id="79" name="Shape 79"/>
+        <p:cNvGrpSpPr/>
+        <p:nvPr/>
+      </p:nvGrpSpPr>
+      <p:grpSpPr>
+        <a:xfrm>
+          <a:off x="0" y="0"/>
+          <a:ext cx="0" cy="0"/>
+          <a:chOff x="0" y="0"/>
+          <a:chExt cx="0" cy="0"/>
+        </a:xfrm>
+      </p:grpSpPr>
+      <p:sp>
+        <p:nvSpPr>
+          <p:cNvPr id="80" name="Google Shape;80;g2ebf47105cd_0_7:notes"/>
+          <p:cNvSpPr/>
+          <p:nvPr>
+            <p:ph idx="2" type="sldImg"/>
+          </p:nvPr>
+        </p:nvSpPr>
+        <p:spPr>
+          <a:xfrm>
+            <a:off x="381300" y="685800"/>
+            <a:ext cx="6096000" cy="3429000"/>
+          </a:xfrm>
+          <a:custGeom>
+            <a:rect b="b" l="l" r="r" t="t"/>
+            <a:pathLst>
+              <a:path extrusionOk="0" h="120000" w="120000">
+                <a:moveTo>
+                  <a:pt x="0" y="0"/>
+                </a:moveTo>
+                <a:lnTo>
+                  <a:pt x="120000" y="0"/>
+                </a:lnTo>
+                <a:lnTo>
+                  <a:pt x="120000" y="120000"/>
+                </a:lnTo>
+                <a:lnTo>
+                  <a:pt x="0" y="120000"/>
+                </a:lnTo>
+                <a:close/>
+              </a:path>
+            </a:pathLst>
+          </a:custGeom>
+        </p:spPr>
+      </p:sp>
+      <p:sp>
+        <p:nvSpPr>
+          <p:cNvPr id="81" name="Google Shape;81;g2ebf47105cd_0_7:notes"/>
           <p:cNvSpPr txBox="1"/>
           <p:nvPr>
             <p:ph idx="1" type="body"/>
@@ -5938,7 +6038,7 @@
             </a:pPr>
             <a:r>
               <a:rPr lang="en-GB"/>
-              <a:t>Número de valores únicos</a:t>
+              <a:t>Estado de los datos</a:t>
             </a:r>
             <a:endParaRPr/>
           </a:p>
@@ -5963,126 +6063,182 @@
         </p:spPr>
         <p:txBody>
           <a:bodyPr anchorCtr="0" anchor="t" bIns="91425" lIns="91425" spcFirstLastPara="1" rIns="91425" wrap="square" tIns="91425">
-            <a:normAutofit/>
+            <a:normAutofit fontScale="77500"/>
           </a:bodyPr>
           <a:lstStyle/>
           <a:p>
-            <a:pPr indent="0" lvl="0" marL="0" rtl="0" algn="l">
-              <a:spcBef>
-                <a:spcPts val="0"/>
-              </a:spcBef>
-              <a:spcAft>
-                <a:spcPts val="0"/>
-              </a:spcAft>
-              <a:buNone/>
+            <a:pPr indent="-317182" lvl="0" marL="457200" rtl="0" algn="l">
+              <a:spcBef>
+                <a:spcPts val="0"/>
+              </a:spcBef>
+              <a:spcAft>
+                <a:spcPts val="0"/>
+              </a:spcAft>
+              <a:buSzPct val="100000"/>
+              <a:buAutoNum type="arabicPeriod"/>
             </a:pPr>
             <a:r>
               <a:rPr lang="en-GB"/>
-              <a:t>Order = 99441</a:t>
+              <a:t>Order_items: datos </a:t>
+            </a:r>
+            <a:r>
+              <a:rPr lang="en-GB"/>
+              <a:t>están</a:t>
+            </a:r>
+            <a:r>
+              <a:rPr lang="en-GB"/>
+              <a:t> en bien estado: sin nan. Hay duplicados, pero este no es error, este es un pedido de un artículo en cantidades de varias piezas. </a:t>
+            </a:r>
+            <a:r>
+              <a:rPr lang="en-GB"/>
+              <a:t>Está</a:t>
+            </a:r>
+            <a:r>
+              <a:rPr lang="en-GB"/>
+              <a:t> añadido 2 columnas: una para la fecha dd/mm/yyyy y en otra la hora hh/mm/ss para los graficos en Power BI.</a:t>
             </a:r>
             <a:endParaRPr/>
           </a:p>
           <a:p>
-            <a:pPr indent="0" lvl="0" marL="0" rtl="0" algn="l">
-              <a:spcBef>
-                <a:spcPts val="1200"/>
-              </a:spcBef>
-              <a:spcAft>
-                <a:spcPts val="0"/>
-              </a:spcAft>
-              <a:buClr>
-                <a:schemeClr val="dk1"/>
-              </a:buClr>
-              <a:buSzPts val="1100"/>
-              <a:buFont typeface="Arial"/>
-              <a:buNone/>
+            <a:pPr indent="-317182" lvl="0" marL="457200" rtl="0" algn="l">
+              <a:spcBef>
+                <a:spcPts val="0"/>
+              </a:spcBef>
+              <a:spcAft>
+                <a:spcPts val="0"/>
+              </a:spcAft>
+              <a:buSzPct val="100000"/>
+              <a:buAutoNum type="arabicPeriod"/>
             </a:pPr>
             <a:r>
               <a:rPr lang="en-GB"/>
-              <a:t>Customer = 99441</a:t>
+              <a:t>Products: datos tienen 620 Nan en category_name y por 2 Nan en las columnas 'weight_g', 'length_cm', 'height_cm', 'width_cm'.</a:t>
             </a:r>
             <a:endParaRPr/>
           </a:p>
           <a:p>
-            <a:pPr indent="0" lvl="0" marL="0" rtl="0" algn="l">
-              <a:spcBef>
-                <a:spcPts val="1200"/>
-              </a:spcBef>
-              <a:spcAft>
-                <a:spcPts val="0"/>
-              </a:spcAft>
-              <a:buNone/>
+            <a:pPr indent="-317182" lvl="0" marL="457200" rtl="0" algn="l">
+              <a:spcBef>
+                <a:spcPts val="0"/>
+              </a:spcBef>
+              <a:spcAft>
+                <a:spcPts val="0"/>
+              </a:spcAft>
+              <a:buSzPct val="100000"/>
+              <a:buAutoNum type="arabicPeriod"/>
             </a:pPr>
             <a:r>
               <a:rPr lang="en-GB"/>
-              <a:t>Seller</a:t>
+              <a:t>Reviews: datos </a:t>
             </a:r>
             <a:r>
               <a:rPr lang="en-GB"/>
-              <a:t> = 3095</a:t>
+              <a:t>están</a:t>
+            </a:r>
+            <a:r>
+              <a:rPr lang="en-GB"/>
+              <a:t> en bien estado, solo la columna score tiene un valor que no es normal - 's'.</a:t>
             </a:r>
             <a:endParaRPr/>
           </a:p>
           <a:p>
-            <a:pPr indent="0" lvl="0" marL="0" rtl="0" algn="l">
-              <a:spcBef>
-                <a:spcPts val="1200"/>
-              </a:spcBef>
-              <a:spcAft>
-                <a:spcPts val="0"/>
-              </a:spcAft>
-              <a:buNone/>
+            <a:pPr indent="-317182" lvl="0" marL="457200" rtl="0" algn="l">
+              <a:spcBef>
+                <a:spcPts val="0"/>
+              </a:spcBef>
+              <a:spcAft>
+                <a:spcPts val="0"/>
+              </a:spcAft>
+              <a:buSzPct val="100000"/>
+              <a:buAutoNum type="arabicPeriod"/>
             </a:pPr>
             <a:r>
               <a:rPr lang="en-GB"/>
-              <a:t>Product = 32951</a:t>
+              <a:t>Sellers: datos </a:t>
+            </a:r>
+            <a:r>
+              <a:rPr lang="en-GB"/>
+              <a:t>están</a:t>
+            </a:r>
+            <a:r>
+              <a:rPr lang="en-GB"/>
+              <a:t> en bien estado.</a:t>
             </a:r>
             <a:endParaRPr/>
           </a:p>
           <a:p>
-            <a:pPr indent="0" lvl="0" marL="0" rtl="0" algn="l">
-              <a:spcBef>
-                <a:spcPts val="1200"/>
-              </a:spcBef>
-              <a:spcAft>
-                <a:spcPts val="0"/>
-              </a:spcAft>
-              <a:buNone/>
+            <a:pPr indent="-317182" lvl="0" marL="457200" rtl="0" algn="l">
+              <a:spcBef>
+                <a:spcPts val="0"/>
+              </a:spcBef>
+              <a:spcAft>
+                <a:spcPts val="0"/>
+              </a:spcAft>
+              <a:buSzPct val="100000"/>
+              <a:buAutoNum type="arabicPeriod"/>
             </a:pPr>
             <a:r>
               <a:rPr lang="en-GB"/>
-              <a:t>Category = 72</a:t>
+              <a:t>Customers: datos </a:t>
+            </a:r>
+            <a:r>
+              <a:rPr lang="en-GB"/>
+              <a:t>están</a:t>
+            </a:r>
+            <a:r>
+              <a:rPr lang="en-GB"/>
+              <a:t> en bien estado. </a:t>
             </a:r>
             <a:endParaRPr/>
           </a:p>
           <a:p>
-            <a:pPr indent="0" lvl="0" marL="0" rtl="0" algn="l">
-              <a:spcBef>
-                <a:spcPts val="1200"/>
-              </a:spcBef>
-              <a:spcAft>
-                <a:spcPts val="0"/>
-              </a:spcAft>
-              <a:buNone/>
+            <a:pPr indent="-317182" lvl="0" marL="457200" rtl="0" algn="l">
+              <a:spcBef>
+                <a:spcPts val="0"/>
+              </a:spcBef>
+              <a:spcAft>
+                <a:spcPts val="0"/>
+              </a:spcAft>
+              <a:buSzPct val="100000"/>
+              <a:buAutoNum type="arabicPeriod"/>
             </a:pPr>
             <a:r>
               <a:rPr lang="en-GB"/>
-              <a:t>Review = 98410</a:t>
+              <a:t>Geolocalizacíon: datos tienen un Nan en la columna 'city' y encabezados de columna en mayúscula</a:t>
             </a:r>
             <a:endParaRPr/>
           </a:p>
           <a:p>
-            <a:pPr indent="0" lvl="0" marL="0" rtl="0" algn="l">
-              <a:spcBef>
-                <a:spcPts val="1200"/>
-              </a:spcBef>
-              <a:spcAft>
-                <a:spcPts val="1200"/>
-              </a:spcAft>
-              <a:buNone/>
+            <a:pPr indent="-317182" lvl="0" marL="457200" rtl="0" algn="l">
+              <a:spcBef>
+                <a:spcPts val="0"/>
+              </a:spcBef>
+              <a:spcAft>
+                <a:spcPts val="0"/>
+              </a:spcAft>
+              <a:buSzPct val="100000"/>
+              <a:buAutoNum type="arabicPeriod"/>
             </a:pPr>
             <a:r>
-              <a:t/>
+              <a:rPr lang="en-GB"/>
+              <a:t>Orders: datos tienen Nan en las columnas 'approved_at', 'delivered_courier_date', 'delivered_customer_date', pero esto es normal. Rellenar valores nulos en las columnas específicas con una fecha por defecto '1970-01-01 00:00:00'.</a:t>
+            </a:r>
+            <a:endParaRPr/>
+          </a:p>
+          <a:p>
+            <a:pPr indent="-317182" lvl="0" marL="457200" rtl="0" algn="l">
+              <a:spcBef>
+                <a:spcPts val="0"/>
+              </a:spcBef>
+              <a:spcAft>
+                <a:spcPts val="0"/>
+              </a:spcAft>
+              <a:buSzPct val="100000"/>
+              <a:buAutoNum type="arabicPeriod"/>
+            </a:pPr>
+            <a:r>
+              <a:rPr lang="en-GB"/>
+              <a:t>Order_payments: datos están en bien estado.</a:t>
             </a:r>
             <a:endParaRPr/>
           </a:p>
@@ -6147,7 +6303,7 @@
             </a:pPr>
             <a:r>
               <a:rPr lang="en-GB"/>
-              <a:t>Demanda</a:t>
+              <a:t>Número de valores únicos</a:t>
             </a:r>
             <a:endParaRPr/>
           </a:p>
@@ -6176,65 +6332,107 @@
           </a:bodyPr>
           <a:lstStyle/>
           <a:p>
-            <a:pPr indent="-342900" lvl="0" marL="457200" rtl="0" algn="l">
-              <a:spcBef>
-                <a:spcPts val="0"/>
-              </a:spcBef>
-              <a:spcAft>
-                <a:spcPts val="0"/>
-              </a:spcAft>
-              <a:buSzPts val="1800"/>
-              <a:buAutoNum type="arabicPeriod"/>
+            <a:pPr indent="0" lvl="0" marL="0" rtl="0" algn="l">
+              <a:spcBef>
+                <a:spcPts val="0"/>
+              </a:spcBef>
+              <a:spcAft>
+                <a:spcPts val="0"/>
+              </a:spcAft>
+              <a:buNone/>
             </a:pPr>
             <a:r>
               <a:rPr lang="en-GB"/>
-              <a:t>Amount/price/freight - por fecha, </a:t>
-            </a:r>
-            <a:r>
-              <a:rPr lang="en-GB"/>
-              <a:t>categoría</a:t>
-            </a:r>
-            <a:r>
-              <a:rPr lang="en-GB"/>
-              <a:t>, producto, seller, cp</a:t>
+              <a:t>Order = 99441</a:t>
             </a:r>
             <a:endParaRPr/>
           </a:p>
           <a:p>
-            <a:pPr indent="-342900" lvl="0" marL="457200" rtl="0" algn="l">
-              <a:spcBef>
-                <a:spcPts val="0"/>
-              </a:spcBef>
-              <a:spcAft>
-                <a:spcPts val="0"/>
-              </a:spcAft>
-              <a:buSzPts val="1800"/>
-              <a:buAutoNum type="arabicPeriod"/>
+            <a:pPr indent="0" lvl="0" marL="0" rtl="0" algn="l">
+              <a:spcBef>
+                <a:spcPts val="1200"/>
+              </a:spcBef>
+              <a:spcAft>
+                <a:spcPts val="0"/>
+              </a:spcAft>
+              <a:buClr>
+                <a:schemeClr val="dk1"/>
+              </a:buClr>
+              <a:buSzPts val="1100"/>
+              <a:buFont typeface="Arial"/>
+              <a:buNone/>
             </a:pPr>
             <a:r>
               <a:rPr lang="en-GB"/>
-              <a:t>Score de review - por category, producto, fecha</a:t>
+              <a:t>Customer = 99441</a:t>
             </a:r>
             <a:endParaRPr/>
           </a:p>
           <a:p>
-            <a:pPr indent="-342900" lvl="0" marL="457200" rtl="0" algn="l">
-              <a:spcBef>
-                <a:spcPts val="0"/>
-              </a:spcBef>
-              <a:spcAft>
-                <a:spcPts val="0"/>
-              </a:spcAft>
-              <a:buSzPts val="1800"/>
-              <a:buAutoNum type="arabicPeriod"/>
+            <a:pPr indent="0" lvl="0" marL="0" rtl="0" algn="l">
+              <a:spcBef>
+                <a:spcPts val="1200"/>
+              </a:spcBef>
+              <a:spcAft>
+                <a:spcPts val="0"/>
+              </a:spcAft>
+              <a:buNone/>
             </a:pPr>
             <a:r>
               <a:rPr lang="en-GB"/>
-              <a:t>T</a:t>
+              <a:t>Seller</a:t>
             </a:r>
             <a:r>
               <a:rPr lang="en-GB"/>
-              <a:t>iempo de entrega - por fecha, categoría</a:t>
+              <a:t> = 3095</a:t>
+            </a:r>
+            <a:endParaRPr/>
+          </a:p>
+          <a:p>
+            <a:pPr indent="0" lvl="0" marL="0" rtl="0" algn="l">
+              <a:spcBef>
+                <a:spcPts val="1200"/>
+              </a:spcBef>
+              <a:spcAft>
+                <a:spcPts val="0"/>
+              </a:spcAft>
+              <a:buNone/>
+            </a:pPr>
+            <a:r>
+              <a:rPr lang="en-GB"/>
+              <a:t>Product = 32951</a:t>
+            </a:r>
+            <a:endParaRPr/>
+          </a:p>
+          <a:p>
+            <a:pPr indent="0" lvl="0" marL="0" rtl="0" algn="l">
+              <a:spcBef>
+                <a:spcPts val="1200"/>
+              </a:spcBef>
+              <a:spcAft>
+                <a:spcPts val="0"/>
+              </a:spcAft>
+              <a:buNone/>
+            </a:pPr>
+            <a:r>
+              <a:rPr lang="en-GB"/>
+              <a:t>Category = 72</a:t>
+            </a:r>
+            <a:endParaRPr/>
+          </a:p>
+          <a:p>
+            <a:pPr indent="0" lvl="0" marL="0" rtl="0" algn="l">
+              <a:spcBef>
+                <a:spcPts val="1200"/>
+              </a:spcBef>
+              <a:spcAft>
+                <a:spcPts val="0"/>
+              </a:spcAft>
+              <a:buNone/>
+            </a:pPr>
+            <a:r>
+              <a:rPr lang="en-GB"/>
+              <a:t>Review = 98410</a:t>
             </a:r>
             <a:endParaRPr/>
           </a:p>
@@ -6314,7 +6512,7 @@
             </a:pPr>
             <a:r>
               <a:rPr lang="en-GB"/>
-              <a:t>Dashboard</a:t>
+              <a:t>Demanda</a:t>
             </a:r>
             <a:endParaRPr/>
           </a:p>
@@ -6355,11 +6553,15 @@
             </a:pPr>
             <a:r>
               <a:rPr lang="en-GB"/>
-              <a:t>Top-5 más ricos y más baratos productos/</a:t>
+              <a:t>Amount/price/freight - por fecha, </a:t>
             </a:r>
             <a:r>
               <a:rPr lang="en-GB"/>
-              <a:t>categorías por price y freight</a:t>
+              <a:t>categoría</a:t>
+            </a:r>
+            <a:r>
+              <a:rPr lang="en-GB"/>
+              <a:t>, producto, seller, cp</a:t>
             </a:r>
             <a:endParaRPr/>
           </a:p>
@@ -6376,7 +6578,7 @@
             </a:pPr>
             <a:r>
               <a:rPr lang="en-GB"/>
-              <a:t>Distribución de scores</a:t>
+              <a:t>Score de review - por category, producto, fecha</a:t>
             </a:r>
             <a:endParaRPr/>
           </a:p>
@@ -6393,41 +6595,26 @@
             </a:pPr>
             <a:r>
               <a:rPr lang="en-GB"/>
-              <a:t>Distribución tipo de payment y installments</a:t>
+              <a:t>T</a:t>
+            </a:r>
+            <a:r>
+              <a:rPr lang="en-GB"/>
+              <a:t>iempo de entrega - por fecha, categoría</a:t>
             </a:r>
             <a:endParaRPr/>
           </a:p>
           <a:p>
-            <a:pPr indent="-342900" lvl="0" marL="457200" rtl="0" algn="l">
-              <a:spcBef>
-                <a:spcPts val="0"/>
-              </a:spcBef>
-              <a:spcAft>
-                <a:spcPts val="0"/>
-              </a:spcAft>
-              <a:buSzPts val="1800"/>
-              <a:buAutoNum type="arabicPeriod"/>
+            <a:pPr indent="0" lvl="0" marL="0" rtl="0" algn="l">
+              <a:spcBef>
+                <a:spcPts val="1200"/>
+              </a:spcBef>
+              <a:spcAft>
+                <a:spcPts val="1200"/>
+              </a:spcAft>
+              <a:buNone/>
             </a:pPr>
             <a:r>
-              <a:rPr lang="en-GB"/>
-              <a:t>Distribución seller y customer por postal code</a:t>
-            </a:r>
-            <a:endParaRPr/>
-          </a:p>
-          <a:p>
-            <a:pPr indent="-342900" lvl="0" marL="457200" rtl="0" algn="l">
-              <a:spcBef>
-                <a:spcPts val="0"/>
-              </a:spcBef>
-              <a:spcAft>
-                <a:spcPts val="0"/>
-              </a:spcAft>
-              <a:buSzPts val="1800"/>
-              <a:buAutoNum type="arabicPeriod"/>
-            </a:pPr>
-            <a:r>
-              <a:rPr lang="en-GB"/>
-              <a:t>Distribución de tiempo de delivery</a:t>
+              <a:t/>
             </a:r>
             <a:endParaRPr/>
           </a:p>
@@ -6492,7 +6679,7 @@
             </a:pPr>
             <a:r>
               <a:rPr lang="en-GB"/>
-              <a:t>Preguntas para NTT</a:t>
+              <a:t>Dashboard</a:t>
             </a:r>
             <a:endParaRPr/>
           </a:p>
@@ -6533,6 +6720,184 @@
             </a:pPr>
             <a:r>
               <a:rPr lang="en-GB"/>
+              <a:t>Top-5 más ricos y más baratos productos/</a:t>
+            </a:r>
+            <a:r>
+              <a:rPr lang="en-GB"/>
+              <a:t>categorías por price y freight</a:t>
+            </a:r>
+            <a:endParaRPr/>
+          </a:p>
+          <a:p>
+            <a:pPr indent="-342900" lvl="0" marL="457200" rtl="0" algn="l">
+              <a:spcBef>
+                <a:spcPts val="0"/>
+              </a:spcBef>
+              <a:spcAft>
+                <a:spcPts val="0"/>
+              </a:spcAft>
+              <a:buSzPts val="1800"/>
+              <a:buAutoNum type="arabicPeriod"/>
+            </a:pPr>
+            <a:r>
+              <a:rPr lang="en-GB"/>
+              <a:t>Distribución de scores</a:t>
+            </a:r>
+            <a:endParaRPr/>
+          </a:p>
+          <a:p>
+            <a:pPr indent="-342900" lvl="0" marL="457200" rtl="0" algn="l">
+              <a:spcBef>
+                <a:spcPts val="0"/>
+              </a:spcBef>
+              <a:spcAft>
+                <a:spcPts val="0"/>
+              </a:spcAft>
+              <a:buSzPts val="1800"/>
+              <a:buAutoNum type="arabicPeriod"/>
+            </a:pPr>
+            <a:r>
+              <a:rPr lang="en-GB"/>
+              <a:t>Distribución tipo de payment y installments</a:t>
+            </a:r>
+            <a:endParaRPr/>
+          </a:p>
+          <a:p>
+            <a:pPr indent="-342900" lvl="0" marL="457200" rtl="0" algn="l">
+              <a:spcBef>
+                <a:spcPts val="0"/>
+              </a:spcBef>
+              <a:spcAft>
+                <a:spcPts val="0"/>
+              </a:spcAft>
+              <a:buSzPts val="1800"/>
+              <a:buAutoNum type="arabicPeriod"/>
+            </a:pPr>
+            <a:r>
+              <a:rPr lang="en-GB"/>
+              <a:t>Distribución seller y customer por postal code</a:t>
+            </a:r>
+            <a:endParaRPr/>
+          </a:p>
+          <a:p>
+            <a:pPr indent="-342900" lvl="0" marL="457200" rtl="0" algn="l">
+              <a:spcBef>
+                <a:spcPts val="0"/>
+              </a:spcBef>
+              <a:spcAft>
+                <a:spcPts val="0"/>
+              </a:spcAft>
+              <a:buSzPts val="1800"/>
+              <a:buAutoNum type="arabicPeriod"/>
+            </a:pPr>
+            <a:r>
+              <a:rPr lang="en-GB"/>
+              <a:t>Distribución de tiempo de delivery</a:t>
+            </a:r>
+            <a:endParaRPr/>
+          </a:p>
+        </p:txBody>
+      </p:sp>
+    </p:spTree>
+  </p:cSld>
+  <p:clrMapOvr>
+    <a:masterClrMapping/>
+  </p:clrMapOvr>
+</p:sld>
+</file>
+
+<file path=ppt/slides/slide6.xml><?xml version="1.0" encoding="utf-8"?>
+<p:sld xmlns:a="http://schemas.openxmlformats.org/drawingml/2006/main" xmlns:r="http://schemas.openxmlformats.org/officeDocument/2006/relationships" xmlns:mc="http://schemas.openxmlformats.org/markup-compatibility/2006" xmlns:mv="urn:schemas-microsoft-com:mac:vml" xmlns:p="http://schemas.openxmlformats.org/presentationml/2006/main" xmlns:c="http://schemas.openxmlformats.org/drawingml/2006/chart" xmlns:dgm="http://schemas.openxmlformats.org/drawingml/2006/diagram" xmlns:o="urn:schemas-microsoft-com:office:office" xmlns:v="urn:schemas-microsoft-com:vml" xmlns:pvml="urn:schemas-microsoft-com:office:powerpoint" xmlns:com="http://schemas.openxmlformats.org/drawingml/2006/compatibility" xmlns:p14="http://schemas.microsoft.com/office/powerpoint/2010/main" xmlns:p15="http://schemas.microsoft.com/office/powerpoint/2012/main" xmlns:ahyp="http://schemas.microsoft.com/office/drawing/2018/hyperlinkcolor">
+  <p:cSld>
+    <p:spTree>
+      <p:nvGrpSpPr>
+        <p:cNvPr id="82" name="Shape 82"/>
+        <p:cNvGrpSpPr/>
+        <p:nvPr/>
+      </p:nvGrpSpPr>
+      <p:grpSpPr>
+        <a:xfrm>
+          <a:off x="0" y="0"/>
+          <a:ext cx="0" cy="0"/>
+          <a:chOff x="0" y="0"/>
+          <a:chExt cx="0" cy="0"/>
+        </a:xfrm>
+      </p:grpSpPr>
+      <p:sp>
+        <p:nvSpPr>
+          <p:cNvPr id="83" name="Google Shape;83;p18"/>
+          <p:cNvSpPr txBox="1"/>
+          <p:nvPr>
+            <p:ph type="title"/>
+          </p:nvPr>
+        </p:nvSpPr>
+        <p:spPr>
+          <a:xfrm>
+            <a:off x="311700" y="445025"/>
+            <a:ext cx="8520600" cy="572700"/>
+          </a:xfrm>
+          <a:prstGeom prst="rect">
+            <a:avLst/>
+          </a:prstGeom>
+        </p:spPr>
+        <p:txBody>
+          <a:bodyPr anchorCtr="0" anchor="t" bIns="91425" lIns="91425" spcFirstLastPara="1" rIns="91425" wrap="square" tIns="91425">
+            <a:normAutofit fontScale="90000"/>
+          </a:bodyPr>
+          <a:lstStyle/>
+          <a:p>
+            <a:pPr indent="0" lvl="0" marL="0" rtl="0" algn="l">
+              <a:spcBef>
+                <a:spcPts val="0"/>
+              </a:spcBef>
+              <a:spcAft>
+                <a:spcPts val="0"/>
+              </a:spcAft>
+              <a:buNone/>
+            </a:pPr>
+            <a:r>
+              <a:rPr lang="en-GB"/>
+              <a:t>Preguntas para NTT</a:t>
+            </a:r>
+            <a:endParaRPr/>
+          </a:p>
+        </p:txBody>
+      </p:sp>
+      <p:sp>
+        <p:nvSpPr>
+          <p:cNvPr id="84" name="Google Shape;84;p18"/>
+          <p:cNvSpPr txBox="1"/>
+          <p:nvPr>
+            <p:ph idx="1" type="body"/>
+          </p:nvPr>
+        </p:nvSpPr>
+        <p:spPr>
+          <a:xfrm>
+            <a:off x="311700" y="1152475"/>
+            <a:ext cx="8520600" cy="3416400"/>
+          </a:xfrm>
+          <a:prstGeom prst="rect">
+            <a:avLst/>
+          </a:prstGeom>
+        </p:spPr>
+        <p:txBody>
+          <a:bodyPr anchorCtr="0" anchor="t" bIns="91425" lIns="91425" spcFirstLastPara="1" rIns="91425" wrap="square" tIns="91425">
+            <a:normAutofit/>
+          </a:bodyPr>
+          <a:lstStyle/>
+          <a:p>
+            <a:pPr indent="-342900" lvl="0" marL="457200" rtl="0" algn="l">
+              <a:spcBef>
+                <a:spcPts val="0"/>
+              </a:spcBef>
+              <a:spcAft>
+                <a:spcPts val="0"/>
+              </a:spcAft>
+              <a:buSzPts val="1800"/>
+              <a:buAutoNum type="arabicPeriod"/>
+            </a:pPr>
+            <a:r>
+              <a:rPr lang="en-GB"/>
               <a:t>Tabla “customers”: que </a:t>
             </a:r>
             <a:r>
@@ -6588,6 +6953,285 @@
 </file>
 
 <file path=ppt/theme/theme1.xml><?xml version="1.0" encoding="utf-8"?>
+<a:theme xmlns:a="http://schemas.openxmlformats.org/drawingml/2006/main" xmlns:r="http://schemas.openxmlformats.org/officeDocument/2006/relationships" name="Simple Light">
+  <a:themeElements>
+    <a:clrScheme name="Simple Light">
+      <a:dk1>
+        <a:srgbClr val="000000"/>
+      </a:dk1>
+      <a:lt1>
+        <a:srgbClr val="FFFFFF"/>
+      </a:lt1>
+      <a:dk2>
+        <a:srgbClr val="595959"/>
+      </a:dk2>
+      <a:lt2>
+        <a:srgbClr val="EEEEEE"/>
+      </a:lt2>
+      <a:accent1>
+        <a:srgbClr val="4285F4"/>
+      </a:accent1>
+      <a:accent2>
+        <a:srgbClr val="212121"/>
+      </a:accent2>
+      <a:accent3>
+        <a:srgbClr val="78909C"/>
+      </a:accent3>
+      <a:accent4>
+        <a:srgbClr val="FFAB40"/>
+      </a:accent4>
+      <a:accent5>
+        <a:srgbClr val="0097A7"/>
+      </a:accent5>
+      <a:accent6>
+        <a:srgbClr val="EEFF41"/>
+      </a:accent6>
+      <a:hlink>
+        <a:srgbClr val="0097A7"/>
+      </a:hlink>
+      <a:folHlink>
+        <a:srgbClr val="0097A7"/>
+      </a:folHlink>
+    </a:clrScheme>
+    <a:fontScheme name="Office">
+      <a:majorFont>
+        <a:latin typeface="Arial"/>
+        <a:ea typeface=""/>
+        <a:cs typeface=""/>
+        <a:font script="Jpan" typeface="ＭＳ Ｐゴシック"/>
+        <a:font script="Hang" typeface="맑은 고딕"/>
+        <a:font script="Hans" typeface="宋体"/>
+        <a:font script="Hant" typeface="新細明體"/>
+        <a:font script="Arab" typeface="Times New Roman"/>
+        <a:font script="Hebr" typeface="Times New Roman"/>
+        <a:font script="Thai" typeface="Angsana New"/>
+        <a:font script="Ethi" typeface="Nyala"/>
+        <a:font script="Beng" typeface="Vrinda"/>
+        <a:font script="Gujr" typeface="Shruti"/>
+        <a:font script="Khmr" typeface="MoolBoran"/>
+        <a:font script="Knda" typeface="Tunga"/>
+        <a:font script="Guru" typeface="Raavi"/>
+        <a:font script="Cans" typeface="Euphemia"/>
+        <a:font script="Cher" typeface="Plantagenet Cherokee"/>
+        <a:font script="Yiii" typeface="Microsoft Yi Baiti"/>
+        <a:font script="Tibt" typeface="Microsoft Himalaya"/>
+        <a:font script="Thaa" typeface="MV Boli"/>
+        <a:font script="Deva" typeface="Mangal"/>
+        <a:font script="Telu" typeface="Gautami"/>
+        <a:font script="Taml" typeface="Latha"/>
+        <a:font script="Syrc" typeface="Estrangelo Edessa"/>
+        <a:font script="Orya" typeface="Kalinga"/>
+        <a:font script="Mlym" typeface="Kartika"/>
+        <a:font script="Laoo" typeface="DokChampa"/>
+        <a:font script="Sinh" typeface="Iskoola Pota"/>
+        <a:font script="Mong" typeface="Mongolian Baiti"/>
+        <a:font script="Viet" typeface="Times New Roman"/>
+        <a:font script="Uigh" typeface="Microsoft Uighur"/>
+        <a:font script="Geor" typeface="Sylfaen"/>
+      </a:majorFont>
+      <a:minorFont>
+        <a:latin typeface="Arial"/>
+        <a:ea typeface=""/>
+        <a:cs typeface=""/>
+        <a:font script="Jpan" typeface="ＭＳ Ｐゴシック"/>
+        <a:font script="Hang" typeface="맑은 고딕"/>
+        <a:font script="Hans" typeface="宋体"/>
+        <a:font script="Hant" typeface="新細明體"/>
+        <a:font script="Arab" typeface="Arial"/>
+        <a:font script="Hebr" typeface="Arial"/>
+        <a:font script="Thai" typeface="Cordia New"/>
+        <a:font script="Ethi" typeface="Nyala"/>
+        <a:font script="Beng" typeface="Vrinda"/>
+        <a:font script="Gujr" typeface="Shruti"/>
+        <a:font script="Khmr" typeface="DaunPenh"/>
+        <a:font script="Knda" typeface="Tunga"/>
+        <a:font script="Guru" typeface="Raavi"/>
+        <a:font script="Cans" typeface="Euphemia"/>
+        <a:font script="Cher" typeface="Plantagenet Cherokee"/>
+        <a:font script="Yiii" typeface="Microsoft Yi Baiti"/>
+        <a:font script="Tibt" typeface="Microsoft Himalaya"/>
+        <a:font script="Thaa" typeface="MV Boli"/>
+        <a:font script="Deva" typeface="Mangal"/>
+        <a:font script="Telu" typeface="Gautami"/>
+        <a:font script="Taml" typeface="Latha"/>
+        <a:font script="Syrc" typeface="Estrangelo Edessa"/>
+        <a:font script="Orya" typeface="Kalinga"/>
+        <a:font script="Mlym" typeface="Kartika"/>
+        <a:font script="Laoo" typeface="DokChampa"/>
+        <a:font script="Sinh" typeface="Iskoola Pota"/>
+        <a:font script="Mong" typeface="Mongolian Baiti"/>
+        <a:font script="Viet" typeface="Arial"/>
+        <a:font script="Uigh" typeface="Microsoft Uighur"/>
+        <a:font script="Geor" typeface="Sylfaen"/>
+      </a:minorFont>
+    </a:fontScheme>
+    <a:fmtScheme name="Office">
+      <a:fillStyleLst>
+        <a:solidFill>
+          <a:schemeClr val="phClr"/>
+        </a:solidFill>
+        <a:gradFill rotWithShape="1">
+          <a:gsLst>
+            <a:gs pos="0">
+              <a:schemeClr val="phClr">
+                <a:tint val="50000"/>
+                <a:satMod val="300000"/>
+              </a:schemeClr>
+            </a:gs>
+            <a:gs pos="35000">
+              <a:schemeClr val="phClr">
+                <a:tint val="37000"/>
+                <a:satMod val="300000"/>
+              </a:schemeClr>
+            </a:gs>
+            <a:gs pos="100000">
+              <a:schemeClr val="phClr">
+                <a:tint val="15000"/>
+                <a:satMod val="350000"/>
+              </a:schemeClr>
+            </a:gs>
+          </a:gsLst>
+          <a:lin ang="16200000" scaled="1"/>
+        </a:gradFill>
+        <a:gradFill rotWithShape="1">
+          <a:gsLst>
+            <a:gs pos="0">
+              <a:schemeClr val="phClr">
+                <a:tint val="100000"/>
+                <a:shade val="100000"/>
+                <a:satMod val="130000"/>
+              </a:schemeClr>
+            </a:gs>
+            <a:gs pos="100000">
+              <a:schemeClr val="phClr">
+                <a:tint val="50000"/>
+                <a:shade val="100000"/>
+                <a:satMod val="350000"/>
+              </a:schemeClr>
+            </a:gs>
+          </a:gsLst>
+          <a:lin ang="16200000" scaled="0"/>
+        </a:gradFill>
+      </a:fillStyleLst>
+      <a:lnStyleLst>
+        <a:ln w="9525" cap="flat" cmpd="sng" algn="ctr">
+          <a:solidFill>
+            <a:schemeClr val="phClr">
+              <a:shade val="95000"/>
+              <a:satMod val="105000"/>
+            </a:schemeClr>
+          </a:solidFill>
+          <a:prstDash val="solid"/>
+        </a:ln>
+        <a:ln w="25400" cap="flat" cmpd="sng" algn="ctr">
+          <a:solidFill>
+            <a:schemeClr val="phClr"/>
+          </a:solidFill>
+          <a:prstDash val="solid"/>
+        </a:ln>
+        <a:ln w="38100" cap="flat" cmpd="sng" algn="ctr">
+          <a:solidFill>
+            <a:schemeClr val="phClr"/>
+          </a:solidFill>
+          <a:prstDash val="solid"/>
+        </a:ln>
+      </a:lnStyleLst>
+      <a:effectStyleLst>
+        <a:effectStyle>
+          <a:effectLst>
+            <a:outerShdw blurRad="40000" dist="20000" dir="5400000" rotWithShape="0">
+              <a:srgbClr val="000000">
+                <a:alpha val="38000"/>
+              </a:srgbClr>
+            </a:outerShdw>
+          </a:effectLst>
+        </a:effectStyle>
+        <a:effectStyle>
+          <a:effectLst>
+            <a:outerShdw blurRad="40000" dist="23000" dir="5400000" rotWithShape="0">
+              <a:srgbClr val="000000">
+                <a:alpha val="35000"/>
+              </a:srgbClr>
+            </a:outerShdw>
+          </a:effectLst>
+        </a:effectStyle>
+        <a:effectStyle>
+          <a:effectLst>
+            <a:outerShdw blurRad="40000" dist="23000" dir="5400000" rotWithShape="0">
+              <a:srgbClr val="000000">
+                <a:alpha val="35000"/>
+              </a:srgbClr>
+            </a:outerShdw>
+          </a:effectLst>
+          <a:scene3d>
+            <a:camera prst="orthographicFront">
+              <a:rot lat="0" lon="0" rev="0"/>
+            </a:camera>
+            <a:lightRig rig="threePt" dir="t">
+              <a:rot lat="0" lon="0" rev="1200000"/>
+            </a:lightRig>
+          </a:scene3d>
+          <a:sp3d>
+            <a:bevelT w="63500" h="25400"/>
+          </a:sp3d>
+        </a:effectStyle>
+      </a:effectStyleLst>
+      <a:bgFillStyleLst>
+        <a:solidFill>
+          <a:schemeClr val="phClr"/>
+        </a:solidFill>
+        <a:gradFill rotWithShape="1">
+          <a:gsLst>
+            <a:gs pos="0">
+              <a:schemeClr val="phClr">
+                <a:tint val="40000"/>
+                <a:satMod val="350000"/>
+              </a:schemeClr>
+            </a:gs>
+            <a:gs pos="40000">
+              <a:schemeClr val="phClr">
+                <a:tint val="45000"/>
+                <a:shade val="99000"/>
+                <a:satMod val="350000"/>
+              </a:schemeClr>
+            </a:gs>
+            <a:gs pos="100000">
+              <a:schemeClr val="phClr">
+                <a:shade val="20000"/>
+                <a:satMod val="255000"/>
+              </a:schemeClr>
+            </a:gs>
+          </a:gsLst>
+          <a:path path="circle">
+            <a:fillToRect l="50000" t="-80000" r="50000" b="180000"/>
+          </a:path>
+        </a:gradFill>
+        <a:gradFill rotWithShape="1">
+          <a:gsLst>
+            <a:gs pos="0">
+              <a:schemeClr val="phClr">
+                <a:tint val="80000"/>
+                <a:satMod val="300000"/>
+              </a:schemeClr>
+            </a:gs>
+            <a:gs pos="100000">
+              <a:schemeClr val="phClr">
+                <a:shade val="30000"/>
+                <a:satMod val="200000"/>
+              </a:schemeClr>
+            </a:gs>
+          </a:gsLst>
+          <a:path path="circle">
+            <a:fillToRect l="50000" t="50000" r="50000" b="50000"/>
+          </a:path>
+        </a:gradFill>
+      </a:bgFillStyleLst>
+    </a:fmtScheme>
+  </a:themeElements>
+</a:theme>
+</file>
+
+<file path=ppt/theme/theme2.xml><?xml version="1.0" encoding="utf-8"?>
 <a:theme xmlns:a="http://schemas.openxmlformats.org/drawingml/2006/main" xmlns:r="http://schemas.openxmlformats.org/officeDocument/2006/relationships">
   <a:themeElements>
     <a:clrScheme name="Default">
@@ -6864,283 +7508,4 @@
     </a:fmtScheme>
   </a:themeElements>
 </a:theme>
-</file>
-
-<file path=ppt/theme/theme2.xml><?xml version="1.0" encoding="utf-8"?>
-<a:theme xmlns:a="http://schemas.openxmlformats.org/drawingml/2006/main" xmlns:r="http://schemas.openxmlformats.org/officeDocument/2006/relationships" name="Simple Light">
-  <a:themeElements>
-    <a:clrScheme name="Simple Light">
-      <a:dk1>
-        <a:srgbClr val="000000"/>
-      </a:dk1>
-      <a:lt1>
-        <a:srgbClr val="FFFFFF"/>
-      </a:lt1>
-      <a:dk2>
-        <a:srgbClr val="595959"/>
-      </a:dk2>
-      <a:lt2>
-        <a:srgbClr val="EEEEEE"/>
-      </a:lt2>
-      <a:accent1>
-        <a:srgbClr val="4285F4"/>
-      </a:accent1>
-      <a:accent2>
-        <a:srgbClr val="212121"/>
-      </a:accent2>
-      <a:accent3>
-        <a:srgbClr val="78909C"/>
-      </a:accent3>
-      <a:accent4>
-        <a:srgbClr val="FFAB40"/>
-      </a:accent4>
-      <a:accent5>
-        <a:srgbClr val="0097A7"/>
-      </a:accent5>
-      <a:accent6>
-        <a:srgbClr val="EEFF41"/>
-      </a:accent6>
-      <a:hlink>
-        <a:srgbClr val="0097A7"/>
-      </a:hlink>
-      <a:folHlink>
-        <a:srgbClr val="0097A7"/>
-      </a:folHlink>
-    </a:clrScheme>
-    <a:fontScheme name="Office">
-      <a:majorFont>
-        <a:latin typeface="Arial"/>
-        <a:ea typeface=""/>
-        <a:cs typeface=""/>
-        <a:font script="Jpan" typeface="ＭＳ Ｐゴシック"/>
-        <a:font script="Hang" typeface="맑은 고딕"/>
-        <a:font script="Hans" typeface="宋体"/>
-        <a:font script="Hant" typeface="新細明體"/>
-        <a:font script="Arab" typeface="Times New Roman"/>
-        <a:font script="Hebr" typeface="Times New Roman"/>
-        <a:font script="Thai" typeface="Angsana New"/>
-        <a:font script="Ethi" typeface="Nyala"/>
-        <a:font script="Beng" typeface="Vrinda"/>
-        <a:font script="Gujr" typeface="Shruti"/>
-        <a:font script="Khmr" typeface="MoolBoran"/>
-        <a:font script="Knda" typeface="Tunga"/>
-        <a:font script="Guru" typeface="Raavi"/>
-        <a:font script="Cans" typeface="Euphemia"/>
-        <a:font script="Cher" typeface="Plantagenet Cherokee"/>
-        <a:font script="Yiii" typeface="Microsoft Yi Baiti"/>
-        <a:font script="Tibt" typeface="Microsoft Himalaya"/>
-        <a:font script="Thaa" typeface="MV Boli"/>
-        <a:font script="Deva" typeface="Mangal"/>
-        <a:font script="Telu" typeface="Gautami"/>
-        <a:font script="Taml" typeface="Latha"/>
-        <a:font script="Syrc" typeface="Estrangelo Edessa"/>
-        <a:font script="Orya" typeface="Kalinga"/>
-        <a:font script="Mlym" typeface="Kartika"/>
-        <a:font script="Laoo" typeface="DokChampa"/>
-        <a:font script="Sinh" typeface="Iskoola Pota"/>
-        <a:font script="Mong" typeface="Mongolian Baiti"/>
-        <a:font script="Viet" typeface="Times New Roman"/>
-        <a:font script="Uigh" typeface="Microsoft Uighur"/>
-        <a:font script="Geor" typeface="Sylfaen"/>
-      </a:majorFont>
-      <a:minorFont>
-        <a:latin typeface="Arial"/>
-        <a:ea typeface=""/>
-        <a:cs typeface=""/>
-        <a:font script="Jpan" typeface="ＭＳ Ｐゴシック"/>
-        <a:font script="Hang" typeface="맑은 고딕"/>
-        <a:font script="Hans" typeface="宋体"/>
-        <a:font script="Hant" typeface="新細明體"/>
-        <a:font script="Arab" typeface="Arial"/>
-        <a:font script="Hebr" typeface="Arial"/>
-        <a:font script="Thai" typeface="Cordia New"/>
-        <a:font script="Ethi" typeface="Nyala"/>
-        <a:font script="Beng" typeface="Vrinda"/>
-        <a:font script="Gujr" typeface="Shruti"/>
-        <a:font script="Khmr" typeface="DaunPenh"/>
-        <a:font script="Knda" typeface="Tunga"/>
-        <a:font script="Guru" typeface="Raavi"/>
-        <a:font script="Cans" typeface="Euphemia"/>
-        <a:font script="Cher" typeface="Plantagenet Cherokee"/>
-        <a:font script="Yiii" typeface="Microsoft Yi Baiti"/>
-        <a:font script="Tibt" typeface="Microsoft Himalaya"/>
-        <a:font script="Thaa" typeface="MV Boli"/>
-        <a:font script="Deva" typeface="Mangal"/>
-        <a:font script="Telu" typeface="Gautami"/>
-        <a:font script="Taml" typeface="Latha"/>
-        <a:font script="Syrc" typeface="Estrangelo Edessa"/>
-        <a:font script="Orya" typeface="Kalinga"/>
-        <a:font script="Mlym" typeface="Kartika"/>
-        <a:font script="Laoo" typeface="DokChampa"/>
-        <a:font script="Sinh" typeface="Iskoola Pota"/>
-        <a:font script="Mong" typeface="Mongolian Baiti"/>
-        <a:font script="Viet" typeface="Arial"/>
-        <a:font script="Uigh" typeface="Microsoft Uighur"/>
-        <a:font script="Geor" typeface="Sylfaen"/>
-      </a:minorFont>
-    </a:fontScheme>
-    <a:fmtScheme name="Office">
-      <a:fillStyleLst>
-        <a:solidFill>
-          <a:schemeClr val="phClr"/>
-        </a:solidFill>
-        <a:gradFill rotWithShape="1">
-          <a:gsLst>
-            <a:gs pos="0">
-              <a:schemeClr val="phClr">
-                <a:tint val="50000"/>
-                <a:satMod val="300000"/>
-              </a:schemeClr>
-            </a:gs>
-            <a:gs pos="35000">
-              <a:schemeClr val="phClr">
-                <a:tint val="37000"/>
-                <a:satMod val="300000"/>
-              </a:schemeClr>
-            </a:gs>
-            <a:gs pos="100000">
-              <a:schemeClr val="phClr">
-                <a:tint val="15000"/>
-                <a:satMod val="350000"/>
-              </a:schemeClr>
-            </a:gs>
-          </a:gsLst>
-          <a:lin ang="16200000" scaled="1"/>
-        </a:gradFill>
-        <a:gradFill rotWithShape="1">
-          <a:gsLst>
-            <a:gs pos="0">
-              <a:schemeClr val="phClr">
-                <a:tint val="100000"/>
-                <a:shade val="100000"/>
-                <a:satMod val="130000"/>
-              </a:schemeClr>
-            </a:gs>
-            <a:gs pos="100000">
-              <a:schemeClr val="phClr">
-                <a:tint val="50000"/>
-                <a:shade val="100000"/>
-                <a:satMod val="350000"/>
-              </a:schemeClr>
-            </a:gs>
-          </a:gsLst>
-          <a:lin ang="16200000" scaled="0"/>
-        </a:gradFill>
-      </a:fillStyleLst>
-      <a:lnStyleLst>
-        <a:ln w="9525" cap="flat" cmpd="sng" algn="ctr">
-          <a:solidFill>
-            <a:schemeClr val="phClr">
-              <a:shade val="95000"/>
-              <a:satMod val="105000"/>
-            </a:schemeClr>
-          </a:solidFill>
-          <a:prstDash val="solid"/>
-        </a:ln>
-        <a:ln w="25400" cap="flat" cmpd="sng" algn="ctr">
-          <a:solidFill>
-            <a:schemeClr val="phClr"/>
-          </a:solidFill>
-          <a:prstDash val="solid"/>
-        </a:ln>
-        <a:ln w="38100" cap="flat" cmpd="sng" algn="ctr">
-          <a:solidFill>
-            <a:schemeClr val="phClr"/>
-          </a:solidFill>
-          <a:prstDash val="solid"/>
-        </a:ln>
-      </a:lnStyleLst>
-      <a:effectStyleLst>
-        <a:effectStyle>
-          <a:effectLst>
-            <a:outerShdw blurRad="40000" dist="20000" dir="5400000" rotWithShape="0">
-              <a:srgbClr val="000000">
-                <a:alpha val="38000"/>
-              </a:srgbClr>
-            </a:outerShdw>
-          </a:effectLst>
-        </a:effectStyle>
-        <a:effectStyle>
-          <a:effectLst>
-            <a:outerShdw blurRad="40000" dist="23000" dir="5400000" rotWithShape="0">
-              <a:srgbClr val="000000">
-                <a:alpha val="35000"/>
-              </a:srgbClr>
-            </a:outerShdw>
-          </a:effectLst>
-        </a:effectStyle>
-        <a:effectStyle>
-          <a:effectLst>
-            <a:outerShdw blurRad="40000" dist="23000" dir="5400000" rotWithShape="0">
-              <a:srgbClr val="000000">
-                <a:alpha val="35000"/>
-              </a:srgbClr>
-            </a:outerShdw>
-          </a:effectLst>
-          <a:scene3d>
-            <a:camera prst="orthographicFront">
-              <a:rot lat="0" lon="0" rev="0"/>
-            </a:camera>
-            <a:lightRig rig="threePt" dir="t">
-              <a:rot lat="0" lon="0" rev="1200000"/>
-            </a:lightRig>
-          </a:scene3d>
-          <a:sp3d>
-            <a:bevelT w="63500" h="25400"/>
-          </a:sp3d>
-        </a:effectStyle>
-      </a:effectStyleLst>
-      <a:bgFillStyleLst>
-        <a:solidFill>
-          <a:schemeClr val="phClr"/>
-        </a:solidFill>
-        <a:gradFill rotWithShape="1">
-          <a:gsLst>
-            <a:gs pos="0">
-              <a:schemeClr val="phClr">
-                <a:tint val="40000"/>
-                <a:satMod val="350000"/>
-              </a:schemeClr>
-            </a:gs>
-            <a:gs pos="40000">
-              <a:schemeClr val="phClr">
-                <a:tint val="45000"/>
-                <a:shade val="99000"/>
-                <a:satMod val="350000"/>
-              </a:schemeClr>
-            </a:gs>
-            <a:gs pos="100000">
-              <a:schemeClr val="phClr">
-                <a:shade val="20000"/>
-                <a:satMod val="255000"/>
-              </a:schemeClr>
-            </a:gs>
-          </a:gsLst>
-          <a:path path="circle">
-            <a:fillToRect l="50000" t="-80000" r="50000" b="180000"/>
-          </a:path>
-        </a:gradFill>
-        <a:gradFill rotWithShape="1">
-          <a:gsLst>
-            <a:gs pos="0">
-              <a:schemeClr val="phClr">
-                <a:tint val="80000"/>
-                <a:satMod val="300000"/>
-              </a:schemeClr>
-            </a:gs>
-            <a:gs pos="100000">
-              <a:schemeClr val="phClr">
-                <a:shade val="30000"/>
-                <a:satMod val="200000"/>
-              </a:schemeClr>
-            </a:gs>
-          </a:gsLst>
-          <a:path path="circle">
-            <a:fillToRect l="50000" t="50000" r="50000" b="50000"/>
-          </a:path>
-        </a:gradFill>
-      </a:bgFillStyleLst>
-    </a:fmtScheme>
-  </a:themeElements>
-</a:theme>
 </file>
</xml_diff>